<commit_message>
Added PDF version of PowerPoint
</commit_message>
<xml_diff>
--- a/Docs/Userinterface_Toolkit.pptx
+++ b/Docs/Userinterface_Toolkit.pptx
@@ -273,6 +273,11 @@
       </a:defRPr>
     </a:lvl9pPr>
   </p:defaultTextStyle>
+  <p:extLst>
+    <p:ext uri="{EFAFB233-063F-42B5-8137-9DF3F51BA10A}">
+      <p15:sldGuideLst xmlns:p15="http://schemas.microsoft.com/office/powerpoint/2012/main"/>
+    </p:ext>
+  </p:extLst>
 </p:presentation>
 </file>
 
@@ -3296,13 +3301,13 @@
   <p:clrMapOvr>
     <a:masterClrMapping/>
   </p:clrMapOvr>
-  <mc:AlternateContent xmlns:mc="http://schemas.openxmlformats.org/markup-compatibility/2006">
-    <mc:Choice xmlns:p159="http://schemas.microsoft.com/office/powerpoint/2015/09/main" Requires="p159">
+  <mc:AlternateContent xmlns:mc="http://schemas.openxmlformats.org/markup-compatibility/2006" xmlns:p159="http://schemas.microsoft.com/office/powerpoint/2015/09/main">
+    <mc:Choice Requires="p159">
       <p:transition xmlns:p14="http://schemas.microsoft.com/office/powerpoint/2010/main" spd="slow" p14:dur="2000">
         <p159:morph option="byObject"/>
       </p:transition>
     </mc:Choice>
-    <mc:Fallback>
+    <mc:Fallback xmlns="">
       <p:transition spd="slow">
         <p:fade/>
       </p:transition>
@@ -3339,13 +3344,13 @@
   <p:clrMapOvr>
     <a:masterClrMapping/>
   </p:clrMapOvr>
-  <mc:AlternateContent xmlns:mc="http://schemas.openxmlformats.org/markup-compatibility/2006">
-    <mc:Choice xmlns:p159="http://schemas.microsoft.com/office/powerpoint/2015/09/main" Requires="p159">
+  <mc:AlternateContent xmlns:mc="http://schemas.openxmlformats.org/markup-compatibility/2006" xmlns:p159="http://schemas.microsoft.com/office/powerpoint/2015/09/main">
+    <mc:Choice Requires="p159">
       <p:transition xmlns:p14="http://schemas.microsoft.com/office/powerpoint/2010/main" spd="slow" p14:dur="2000">
         <p159:morph option="byObject"/>
       </p:transition>
     </mc:Choice>
-    <mc:Fallback>
+    <mc:Fallback xmlns="">
       <p:transition spd="slow">
         <p:fade/>
       </p:transition>
@@ -4328,13 +4333,13 @@
   <p:clrMapOvr>
     <a:masterClrMapping/>
   </p:clrMapOvr>
-  <mc:AlternateContent xmlns:mc="http://schemas.openxmlformats.org/markup-compatibility/2006">
-    <mc:Choice xmlns:p159="http://schemas.microsoft.com/office/powerpoint/2015/09/main" Requires="p159">
+  <mc:AlternateContent xmlns:mc="http://schemas.openxmlformats.org/markup-compatibility/2006" xmlns:p159="http://schemas.microsoft.com/office/powerpoint/2015/09/main">
+    <mc:Choice Requires="p159">
       <p:transition xmlns:p14="http://schemas.microsoft.com/office/powerpoint/2010/main" spd="slow" p14:dur="2000">
         <p159:morph option="byObject"/>
       </p:transition>
     </mc:Choice>
-    <mc:Fallback>
+    <mc:Fallback xmlns="">
       <p:transition spd="slow">
         <p:fade/>
       </p:transition>
@@ -5611,13 +5616,13 @@
   <p:clrMapOvr>
     <a:masterClrMapping/>
   </p:clrMapOvr>
-  <mc:AlternateContent xmlns:mc="http://schemas.openxmlformats.org/markup-compatibility/2006">
-    <mc:Choice xmlns:p159="http://schemas.microsoft.com/office/powerpoint/2015/09/main" Requires="p159">
+  <mc:AlternateContent xmlns:mc="http://schemas.openxmlformats.org/markup-compatibility/2006" xmlns:p159="http://schemas.microsoft.com/office/powerpoint/2015/09/main">
+    <mc:Choice Requires="p159">
       <p:transition xmlns:p14="http://schemas.microsoft.com/office/powerpoint/2010/main" spd="slow" p14:dur="2000">
         <p159:morph option="byObject"/>
       </p:transition>
     </mc:Choice>
-    <mc:Fallback>
+    <mc:Fallback xmlns="">
       <p:transition spd="slow">
         <p:fade/>
       </p:transition>
@@ -6207,13 +6212,13 @@
   <p:clrMapOvr>
     <a:masterClrMapping/>
   </p:clrMapOvr>
-  <mc:AlternateContent xmlns:mc="http://schemas.openxmlformats.org/markup-compatibility/2006">
-    <mc:Choice xmlns:p159="http://schemas.microsoft.com/office/powerpoint/2015/09/main" Requires="p159">
+  <mc:AlternateContent xmlns:mc="http://schemas.openxmlformats.org/markup-compatibility/2006" xmlns:p159="http://schemas.microsoft.com/office/powerpoint/2015/09/main">
+    <mc:Choice Requires="p159">
       <p:transition xmlns:p14="http://schemas.microsoft.com/office/powerpoint/2010/main" spd="slow" p14:dur="2000">
         <p159:morph option="byObject"/>
       </p:transition>
     </mc:Choice>
-    <mc:Fallback>
+    <mc:Fallback xmlns="">
       <p:transition spd="slow">
         <p:fade/>
       </p:transition>
@@ -7012,13 +7017,13 @@
   <p:clrMapOvr>
     <a:masterClrMapping/>
   </p:clrMapOvr>
-  <mc:AlternateContent xmlns:mc="http://schemas.openxmlformats.org/markup-compatibility/2006">
-    <mc:Choice xmlns:p159="http://schemas.microsoft.com/office/powerpoint/2015/09/main" Requires="p159">
+  <mc:AlternateContent xmlns:mc="http://schemas.openxmlformats.org/markup-compatibility/2006" xmlns:p159="http://schemas.microsoft.com/office/powerpoint/2015/09/main">
+    <mc:Choice Requires="p159">
       <p:transition xmlns:p14="http://schemas.microsoft.com/office/powerpoint/2010/main" spd="slow" p14:dur="2000">
         <p159:morph option="byObject"/>
       </p:transition>
     </mc:Choice>
-    <mc:Fallback>
+    <mc:Fallback xmlns="">
       <p:transition spd="slow">
         <p:fade/>
       </p:transition>
@@ -7661,13 +7666,13 @@
   <p:clrMapOvr>
     <a:masterClrMapping/>
   </p:clrMapOvr>
-  <mc:AlternateContent xmlns:mc="http://schemas.openxmlformats.org/markup-compatibility/2006">
-    <mc:Choice xmlns:p159="http://schemas.microsoft.com/office/powerpoint/2015/09/main" Requires="p159">
+  <mc:AlternateContent xmlns:mc="http://schemas.openxmlformats.org/markup-compatibility/2006" xmlns:p159="http://schemas.microsoft.com/office/powerpoint/2015/09/main">
+    <mc:Choice Requires="p159">
       <p:transition xmlns:p14="http://schemas.microsoft.com/office/powerpoint/2010/main" spd="slow" p14:dur="2000">
         <p159:morph option="byObject"/>
       </p:transition>
     </mc:Choice>
-    <mc:Fallback>
+    <mc:Fallback xmlns="">
       <p:transition spd="slow">
         <p:fade/>
       </p:transition>
@@ -8519,13 +8524,13 @@
   <p:clrMapOvr>
     <a:masterClrMapping/>
   </p:clrMapOvr>
-  <mc:AlternateContent xmlns:mc="http://schemas.openxmlformats.org/markup-compatibility/2006">
-    <mc:Choice xmlns:p159="http://schemas.microsoft.com/office/powerpoint/2015/09/main" Requires="p159">
+  <mc:AlternateContent xmlns:mc="http://schemas.openxmlformats.org/markup-compatibility/2006" xmlns:p159="http://schemas.microsoft.com/office/powerpoint/2015/09/main">
+    <mc:Choice Requires="p159">
       <p:transition xmlns:p14="http://schemas.microsoft.com/office/powerpoint/2010/main" spd="slow" p14:dur="2000">
         <p159:morph option="byObject"/>
       </p:transition>
     </mc:Choice>
-    <mc:Fallback>
+    <mc:Fallback xmlns="">
       <p:transition spd="slow">
         <p:fade/>
       </p:transition>
@@ -9129,13 +9134,13 @@
   <p:clrMapOvr>
     <a:masterClrMapping/>
   </p:clrMapOvr>
-  <mc:AlternateContent xmlns:mc="http://schemas.openxmlformats.org/markup-compatibility/2006">
-    <mc:Choice xmlns:p159="http://schemas.microsoft.com/office/powerpoint/2015/09/main" Requires="p159">
+  <mc:AlternateContent xmlns:mc="http://schemas.openxmlformats.org/markup-compatibility/2006" xmlns:p159="http://schemas.microsoft.com/office/powerpoint/2015/09/main">
+    <mc:Choice Requires="p159">
       <p:transition xmlns:p14="http://schemas.microsoft.com/office/powerpoint/2010/main" spd="slow" p14:dur="2000">
         <p159:morph option="byObject"/>
       </p:transition>
     </mc:Choice>
-    <mc:Fallback>
+    <mc:Fallback xmlns="">
       <p:transition spd="slow">
         <p:fade/>
       </p:transition>
@@ -9936,13 +9941,13 @@
   <p:clrMapOvr>
     <a:masterClrMapping/>
   </p:clrMapOvr>
-  <mc:AlternateContent xmlns:mc="http://schemas.openxmlformats.org/markup-compatibility/2006">
-    <mc:Choice xmlns:p159="http://schemas.microsoft.com/office/powerpoint/2015/09/main" Requires="p159">
+  <mc:AlternateContent xmlns:mc="http://schemas.openxmlformats.org/markup-compatibility/2006" xmlns:p159="http://schemas.microsoft.com/office/powerpoint/2015/09/main">
+    <mc:Choice Requires="p159">
       <p:transition xmlns:p14="http://schemas.microsoft.com/office/powerpoint/2010/main" spd="slow" p14:dur="2000">
         <p159:morph option="byObject"/>
       </p:transition>
     </mc:Choice>
-    <mc:Fallback>
+    <mc:Fallback xmlns="">
       <p:transition spd="slow">
         <p:fade/>
       </p:transition>
@@ -10663,13 +10668,13 @@
     <p:sldLayoutId id="2147483657" r:id="rId9"/>
     <p:sldLayoutId id="2147483658" r:id="rId10"/>
   </p:sldLayoutIdLst>
-  <mc:AlternateContent xmlns:mc="http://schemas.openxmlformats.org/markup-compatibility/2006">
-    <mc:Choice xmlns:p159="http://schemas.microsoft.com/office/powerpoint/2015/09/main" Requires="p159">
+  <mc:AlternateContent xmlns:mc="http://schemas.openxmlformats.org/markup-compatibility/2006" xmlns:p159="http://schemas.microsoft.com/office/powerpoint/2015/09/main">
+    <mc:Choice Requires="p159">
       <p:transition xmlns:p14="http://schemas.microsoft.com/office/powerpoint/2010/main" spd="slow" p14:dur="2000">
         <p159:morph option="byObject"/>
       </p:transition>
     </mc:Choice>
-    <mc:Fallback>
+    <mc:Fallback xmlns="">
       <p:transition spd="slow">
         <p:fade/>
       </p:transition>
@@ -11781,13 +11786,13 @@
   <p:clrMapOvr>
     <a:masterClrMapping/>
   </p:clrMapOvr>
-  <mc:AlternateContent xmlns:mc="http://schemas.openxmlformats.org/markup-compatibility/2006">
-    <mc:Choice xmlns:p159="http://schemas.microsoft.com/office/powerpoint/2015/09/main" Requires="p159">
+  <mc:AlternateContent xmlns:mc="http://schemas.openxmlformats.org/markup-compatibility/2006" xmlns:p159="http://schemas.microsoft.com/office/powerpoint/2015/09/main">
+    <mc:Choice Requires="p159">
       <p:transition xmlns:p14="http://schemas.microsoft.com/office/powerpoint/2010/main" spd="slow" p14:dur="2000">
         <p159:morph option="byObject"/>
       </p:transition>
     </mc:Choice>
-    <mc:Fallback>
+    <mc:Fallback xmlns="">
       <p:transition spd="slow">
         <p:fade/>
       </p:transition>
@@ -12933,13 +12938,13 @@
   <p:clrMapOvr>
     <a:masterClrMapping/>
   </p:clrMapOvr>
-  <mc:AlternateContent xmlns:mc="http://schemas.openxmlformats.org/markup-compatibility/2006">
-    <mc:Choice xmlns:p159="http://schemas.microsoft.com/office/powerpoint/2015/09/main" Requires="p159">
+  <mc:AlternateContent xmlns:mc="http://schemas.openxmlformats.org/markup-compatibility/2006" xmlns:p159="http://schemas.microsoft.com/office/powerpoint/2015/09/main">
+    <mc:Choice Requires="p159">
       <p:transition xmlns:p14="http://schemas.microsoft.com/office/powerpoint/2010/main" spd="slow" p14:dur="2000">
         <p159:morph option="byObject"/>
       </p:transition>
     </mc:Choice>
-    <mc:Fallback>
+    <mc:Fallback xmlns="">
       <p:transition spd="slow">
         <p:fade/>
       </p:transition>
@@ -13715,13 +13720,13 @@
   <p:clrMapOvr>
     <a:masterClrMapping/>
   </p:clrMapOvr>
-  <mc:AlternateContent xmlns:mc="http://schemas.openxmlformats.org/markup-compatibility/2006">
-    <mc:Choice xmlns:p159="http://schemas.microsoft.com/office/powerpoint/2015/09/main" Requires="p159">
+  <mc:AlternateContent xmlns:mc="http://schemas.openxmlformats.org/markup-compatibility/2006" xmlns:p159="http://schemas.microsoft.com/office/powerpoint/2015/09/main">
+    <mc:Choice Requires="p159">
       <p:transition xmlns:p14="http://schemas.microsoft.com/office/powerpoint/2010/main" spd="slow" p14:dur="2000">
         <p159:morph option="byObject"/>
       </p:transition>
     </mc:Choice>
-    <mc:Fallback>
+    <mc:Fallback xmlns="">
       <p:transition spd="slow">
         <p:fade/>
       </p:transition>
@@ -14497,13 +14502,13 @@
   <p:clrMapOvr>
     <a:masterClrMapping/>
   </p:clrMapOvr>
-  <mc:AlternateContent xmlns:mc="http://schemas.openxmlformats.org/markup-compatibility/2006">
-    <mc:Choice xmlns:p159="http://schemas.microsoft.com/office/powerpoint/2015/09/main" Requires="p159">
+  <mc:AlternateContent xmlns:mc="http://schemas.openxmlformats.org/markup-compatibility/2006" xmlns:p159="http://schemas.microsoft.com/office/powerpoint/2015/09/main">
+    <mc:Choice Requires="p159">
       <p:transition xmlns:p14="http://schemas.microsoft.com/office/powerpoint/2010/main" spd="slow" p14:dur="2000">
         <p159:morph option="byObject"/>
       </p:transition>
     </mc:Choice>
-    <mc:Fallback>
+    <mc:Fallback xmlns="">
       <p:transition spd="slow">
         <p:fade/>
       </p:transition>
@@ -17241,13 +17246,13 @@
   <p:clrMapOvr>
     <a:masterClrMapping/>
   </p:clrMapOvr>
-  <mc:AlternateContent xmlns:mc="http://schemas.openxmlformats.org/markup-compatibility/2006">
-    <mc:Choice xmlns:p159="http://schemas.microsoft.com/office/powerpoint/2015/09/main" Requires="p159">
+  <mc:AlternateContent xmlns:mc="http://schemas.openxmlformats.org/markup-compatibility/2006" xmlns:p159="http://schemas.microsoft.com/office/powerpoint/2015/09/main">
+    <mc:Choice Requires="p159">
       <p:transition xmlns:p14="http://schemas.microsoft.com/office/powerpoint/2010/main" spd="slow" p14:dur="2000">
         <p159:morph option="byObject"/>
       </p:transition>
     </mc:Choice>
-    <mc:Fallback>
+    <mc:Fallback xmlns="">
       <p:transition spd="slow">
         <p:fade/>
       </p:transition>
@@ -18516,13 +18521,13 @@
   <p:clrMapOvr>
     <a:masterClrMapping/>
   </p:clrMapOvr>
-  <mc:AlternateContent xmlns:mc="http://schemas.openxmlformats.org/markup-compatibility/2006">
-    <mc:Choice xmlns:p159="http://schemas.microsoft.com/office/powerpoint/2015/09/main" Requires="p159">
+  <mc:AlternateContent xmlns:mc="http://schemas.openxmlformats.org/markup-compatibility/2006" xmlns:p159="http://schemas.microsoft.com/office/powerpoint/2015/09/main">
+    <mc:Choice Requires="p159">
       <p:transition xmlns:p14="http://schemas.microsoft.com/office/powerpoint/2010/main" spd="slow" p14:dur="2000">
         <p159:morph option="byObject"/>
       </p:transition>
     </mc:Choice>
-    <mc:Fallback>
+    <mc:Fallback xmlns="">
       <p:transition spd="slow">
         <p:fade/>
       </p:transition>
@@ -19293,13 +19298,13 @@
   <p:clrMapOvr>
     <a:masterClrMapping/>
   </p:clrMapOvr>
-  <mc:AlternateContent xmlns:mc="http://schemas.openxmlformats.org/markup-compatibility/2006">
-    <mc:Choice xmlns:p159="http://schemas.microsoft.com/office/powerpoint/2015/09/main" Requires="p159">
+  <mc:AlternateContent xmlns:mc="http://schemas.openxmlformats.org/markup-compatibility/2006" xmlns:p159="http://schemas.microsoft.com/office/powerpoint/2015/09/main">
+    <mc:Choice Requires="p159">
       <p:transition xmlns:p14="http://schemas.microsoft.com/office/powerpoint/2010/main" spd="slow" p14:dur="2000">
         <p159:morph option="byObject"/>
       </p:transition>
     </mc:Choice>
-    <mc:Fallback>
+    <mc:Fallback xmlns="">
       <p:transition spd="slow">
         <p:fade/>
       </p:transition>
@@ -19428,7 +19433,7 @@
                   <a:cs typeface="Poppins SemiBold"/>
                   <a:sym typeface="Poppins SemiBold"/>
                 </a:rPr>
-                <a:t>Was ist Ribbon überhaupt?</a:t>
+                <a:t>Was ist Ribbon überhaupt? Was hat es mit Toolbar zutun?</a:t>
               </a:r>
               <a:endParaRPr sz="1800" dirty="0">
                 <a:solidFill>
@@ -20270,13 +20275,13 @@
   <p:clrMapOvr>
     <a:masterClrMapping/>
   </p:clrMapOvr>
-  <mc:AlternateContent xmlns:mc="http://schemas.openxmlformats.org/markup-compatibility/2006">
-    <mc:Choice xmlns:p159="http://schemas.microsoft.com/office/powerpoint/2015/09/main" Requires="p159">
+  <mc:AlternateContent xmlns:mc="http://schemas.openxmlformats.org/markup-compatibility/2006" xmlns:p159="http://schemas.microsoft.com/office/powerpoint/2015/09/main">
+    <mc:Choice Requires="p159">
       <p:transition xmlns:p14="http://schemas.microsoft.com/office/powerpoint/2010/main" spd="slow" p14:dur="2000">
         <p159:morph option="byObject"/>
       </p:transition>
     </mc:Choice>
-    <mc:Fallback>
+    <mc:Fallback xmlns="">
       <p:transition spd="slow">
         <p:fade/>
       </p:transition>
@@ -21277,13 +21282,13 @@
   <p:clrMapOvr>
     <a:masterClrMapping/>
   </p:clrMapOvr>
-  <mc:AlternateContent xmlns:mc="http://schemas.openxmlformats.org/markup-compatibility/2006">
-    <mc:Choice xmlns:p159="http://schemas.microsoft.com/office/powerpoint/2015/09/main" Requires="p159">
+  <mc:AlternateContent xmlns:mc="http://schemas.openxmlformats.org/markup-compatibility/2006" xmlns:p159="http://schemas.microsoft.com/office/powerpoint/2015/09/main">
+    <mc:Choice Requires="p159">
       <p:transition xmlns:p14="http://schemas.microsoft.com/office/powerpoint/2010/main" spd="slow" p14:dur="2000">
         <p159:morph option="byObject"/>
       </p:transition>
     </mc:Choice>
-    <mc:Fallback>
+    <mc:Fallback xmlns="">
       <p:transition spd="slow">
         <p:fade/>
       </p:transition>
@@ -22059,13 +22064,13 @@
   <p:clrMapOvr>
     <a:masterClrMapping/>
   </p:clrMapOvr>
-  <mc:AlternateContent xmlns:mc="http://schemas.openxmlformats.org/markup-compatibility/2006">
-    <mc:Choice xmlns:p159="http://schemas.microsoft.com/office/powerpoint/2015/09/main" Requires="p159">
+  <mc:AlternateContent xmlns:mc="http://schemas.openxmlformats.org/markup-compatibility/2006" xmlns:p159="http://schemas.microsoft.com/office/powerpoint/2015/09/main">
+    <mc:Choice Requires="p159">
       <p:transition xmlns:p14="http://schemas.microsoft.com/office/powerpoint/2010/main" spd="slow" p14:dur="2000">
         <p159:morph option="byObject"/>
       </p:transition>
     </mc:Choice>
-    <mc:Fallback>
+    <mc:Fallback xmlns="">
       <p:transition spd="slow">
         <p:fade/>
       </p:transition>
@@ -23044,13 +23049,13 @@
   <p:clrMapOvr>
     <a:masterClrMapping/>
   </p:clrMapOvr>
-  <mc:AlternateContent xmlns:mc="http://schemas.openxmlformats.org/markup-compatibility/2006">
-    <mc:Choice xmlns:p159="http://schemas.microsoft.com/office/powerpoint/2015/09/main" Requires="p159">
+  <mc:AlternateContent xmlns:mc="http://schemas.openxmlformats.org/markup-compatibility/2006" xmlns:p159="http://schemas.microsoft.com/office/powerpoint/2015/09/main">
+    <mc:Choice Requires="p159">
       <p:transition xmlns:p14="http://schemas.microsoft.com/office/powerpoint/2010/main" spd="slow" p14:dur="2000">
         <p159:morph option="byObject"/>
       </p:transition>
     </mc:Choice>
-    <mc:Fallback>
+    <mc:Fallback xmlns="">
       <p:transition spd="slow">
         <p:fade/>
       </p:transition>
@@ -23826,13 +23831,13 @@
   <p:clrMapOvr>
     <a:masterClrMapping/>
   </p:clrMapOvr>
-  <mc:AlternateContent xmlns:mc="http://schemas.openxmlformats.org/markup-compatibility/2006">
-    <mc:Choice xmlns:p159="http://schemas.microsoft.com/office/powerpoint/2015/09/main" Requires="p159">
+  <mc:AlternateContent xmlns:mc="http://schemas.openxmlformats.org/markup-compatibility/2006" xmlns:p159="http://schemas.microsoft.com/office/powerpoint/2015/09/main">
+    <mc:Choice Requires="p159">
       <p:transition xmlns:p14="http://schemas.microsoft.com/office/powerpoint/2010/main" spd="slow" p14:dur="2000">
         <p159:morph option="byObject"/>
       </p:transition>
     </mc:Choice>
-    <mc:Fallback>
+    <mc:Fallback xmlns="">
       <p:transition spd="slow">
         <p:fade/>
       </p:transition>
@@ -24608,13 +24613,13 @@
   <p:clrMapOvr>
     <a:masterClrMapping/>
   </p:clrMapOvr>
-  <mc:AlternateContent xmlns:mc="http://schemas.openxmlformats.org/markup-compatibility/2006">
-    <mc:Choice xmlns:p159="http://schemas.microsoft.com/office/powerpoint/2015/09/main" Requires="p159">
+  <mc:AlternateContent xmlns:mc="http://schemas.openxmlformats.org/markup-compatibility/2006" xmlns:p159="http://schemas.microsoft.com/office/powerpoint/2015/09/main">
+    <mc:Choice Requires="p159">
       <p:transition xmlns:p14="http://schemas.microsoft.com/office/powerpoint/2010/main" spd="slow" p14:dur="2000">
         <p159:morph option="byObject"/>
       </p:transition>
     </mc:Choice>
-    <mc:Fallback>
+    <mc:Fallback xmlns="">
       <p:transition spd="slow">
         <p:fade/>
       </p:transition>

</xml_diff>